<commit_message>
insert photos and links
</commit_message>
<xml_diff>
--- a/ZipCord-GenAI-PPT.pptx
+++ b/ZipCord-GenAI-PPT.pptx
@@ -251,7 +251,7 @@
           <a:p>
             <a:fld id="{243BF26B-0933-4A58-817D-6DBF03AD9535}" type="datetimeFigureOut">
               <a:rPr lang="en-IN" smtClean="0"/>
-              <a:t>22-03-2025</a:t>
+              <a:t>25-03-2025</a:t>
             </a:fld>
             <a:endParaRPr lang="en-IN"/>
           </a:p>
@@ -956,7 +956,7 @@
           <a:p>
             <a:fld id="{1212FF37-2284-44EF-98CB-98262E5BCAF4}" type="datetimeFigureOut">
               <a:rPr lang="en-IN" smtClean="0"/>
-              <a:t>22-03-2025</a:t>
+              <a:t>25-03-2025</a:t>
             </a:fld>
             <a:endParaRPr lang="en-IN"/>
           </a:p>
@@ -1156,7 +1156,7 @@
           <a:p>
             <a:fld id="{1212FF37-2284-44EF-98CB-98262E5BCAF4}" type="datetimeFigureOut">
               <a:rPr lang="en-IN" smtClean="0"/>
-              <a:t>22-03-2025</a:t>
+              <a:t>25-03-2025</a:t>
             </a:fld>
             <a:endParaRPr lang="en-IN"/>
           </a:p>
@@ -1366,7 +1366,7 @@
           <a:p>
             <a:fld id="{1212FF37-2284-44EF-98CB-98262E5BCAF4}" type="datetimeFigureOut">
               <a:rPr lang="en-IN" smtClean="0"/>
-              <a:t>22-03-2025</a:t>
+              <a:t>25-03-2025</a:t>
             </a:fld>
             <a:endParaRPr lang="en-IN"/>
           </a:p>
@@ -1566,7 +1566,7 @@
           <a:p>
             <a:fld id="{1212FF37-2284-44EF-98CB-98262E5BCAF4}" type="datetimeFigureOut">
               <a:rPr lang="en-IN" smtClean="0"/>
-              <a:t>22-03-2025</a:t>
+              <a:t>25-03-2025</a:t>
             </a:fld>
             <a:endParaRPr lang="en-IN"/>
           </a:p>
@@ -1842,7 +1842,7 @@
           <a:p>
             <a:fld id="{1212FF37-2284-44EF-98CB-98262E5BCAF4}" type="datetimeFigureOut">
               <a:rPr lang="en-IN" smtClean="0"/>
-              <a:t>22-03-2025</a:t>
+              <a:t>25-03-2025</a:t>
             </a:fld>
             <a:endParaRPr lang="en-IN"/>
           </a:p>
@@ -2110,7 +2110,7 @@
           <a:p>
             <a:fld id="{1212FF37-2284-44EF-98CB-98262E5BCAF4}" type="datetimeFigureOut">
               <a:rPr lang="en-IN" smtClean="0"/>
-              <a:t>22-03-2025</a:t>
+              <a:t>25-03-2025</a:t>
             </a:fld>
             <a:endParaRPr lang="en-IN"/>
           </a:p>
@@ -2525,7 +2525,7 @@
           <a:p>
             <a:fld id="{1212FF37-2284-44EF-98CB-98262E5BCAF4}" type="datetimeFigureOut">
               <a:rPr lang="en-IN" smtClean="0"/>
-              <a:t>22-03-2025</a:t>
+              <a:t>25-03-2025</a:t>
             </a:fld>
             <a:endParaRPr lang="en-IN"/>
           </a:p>
@@ -2667,7 +2667,7 @@
           <a:p>
             <a:fld id="{1212FF37-2284-44EF-98CB-98262E5BCAF4}" type="datetimeFigureOut">
               <a:rPr lang="en-IN" smtClean="0"/>
-              <a:t>22-03-2025</a:t>
+              <a:t>25-03-2025</a:t>
             </a:fld>
             <a:endParaRPr lang="en-IN"/>
           </a:p>
@@ -3152,7 +3152,7 @@
           <a:p>
             <a:fld id="{1212FF37-2284-44EF-98CB-98262E5BCAF4}" type="datetimeFigureOut">
               <a:rPr lang="en-IN" smtClean="0"/>
-              <a:t>22-03-2025</a:t>
+              <a:t>25-03-2025</a:t>
             </a:fld>
             <a:endParaRPr lang="en-IN"/>
           </a:p>
@@ -3441,7 +3441,7 @@
           <a:p>
             <a:fld id="{1212FF37-2284-44EF-98CB-98262E5BCAF4}" type="datetimeFigureOut">
               <a:rPr lang="en-IN" smtClean="0"/>
-              <a:t>22-03-2025</a:t>
+              <a:t>25-03-2025</a:t>
             </a:fld>
             <a:endParaRPr lang="en-IN"/>
           </a:p>
@@ -3684,7 +3684,7 @@
           <a:p>
             <a:fld id="{1212FF37-2284-44EF-98CB-98262E5BCAF4}" type="datetimeFigureOut">
               <a:rPr lang="en-IN" smtClean="0"/>
-              <a:t>22-03-2025</a:t>
+              <a:t>25-03-2025</a:t>
             </a:fld>
             <a:endParaRPr lang="en-IN"/>
           </a:p>
@@ -4307,7 +4307,7 @@
                 <a:defRPr/>
               </a:pPr>
               <a:r>
-                <a:rPr kumimoji="0" lang="en-IN" sz="4800" b="1" i="0" u="none" strike="noStrike" kern="1200" cap="none" spc="0" normalizeH="0" baseline="0" noProof="0">
+                <a:rPr kumimoji="0" lang="en-IN" sz="4800" b="1" i="0" u="none" strike="noStrike" kern="1200" cap="none" spc="0" normalizeH="0" baseline="0" noProof="0" dirty="0" err="1">
                   <a:ln>
                     <a:noFill/>
                   </a:ln>
@@ -4325,7 +4325,7 @@
                 <a:t>ZipCord</a:t>
               </a:r>
               <a:r>
-                <a:rPr kumimoji="0" lang="en-IN" sz="4800" b="1" i="0" u="none" strike="noStrike" kern="1200" cap="none" spc="0" normalizeH="0" baseline="0" noProof="0">
+                <a:rPr kumimoji="0" lang="en-IN" sz="4800" b="1" i="0" u="none" strike="noStrike" kern="1200" cap="none" spc="0" normalizeH="0" baseline="0" noProof="0" dirty="0">
                   <a:ln>
                     <a:noFill/>
                   </a:ln>
@@ -6602,7 +6602,7 @@
                   <a:tabLst/>
                   <a:defRPr/>
                 </a:pPr>
-                <a:endParaRPr kumimoji="0" lang="en-IN" sz="1800" b="0" i="0" u="none" strike="noStrike" kern="1200" cap="none" spc="0" normalizeH="0" baseline="0" noProof="0">
+                <a:endParaRPr kumimoji="0" lang="en-IN" sz="1800" b="0" i="0" u="none" strike="noStrike" kern="1200" cap="none" spc="0" normalizeH="0" baseline="0" noProof="0" dirty="0">
                   <a:ln>
                     <a:noFill/>
                   </a:ln>
@@ -7134,6 +7134,23 @@
                 <a:defRPr/>
               </a:pPr>
               <a:r>
+                <a:rPr kumimoji="0" lang="en-IN" sz="1400" b="1" i="0" u="none" strike="noStrike" kern="1200" cap="none" spc="0" normalizeH="0" baseline="0" noProof="0" dirty="0">
+                  <a:ln>
+                    <a:noFill/>
+                  </a:ln>
+                  <a:solidFill>
+                    <a:prstClr val="white">
+                      <a:lumMod val="50000"/>
+                    </a:prstClr>
+                  </a:solidFill>
+                  <a:effectLst/>
+                  <a:uLnTx/>
+                  <a:uFillTx/>
+                  <a:latin typeface="Bahnschrift" panose="020B0502040204020203" pitchFamily="34" charset="0"/>
+                </a:rPr>
+                <a:t>Harish </a:t>
+              </a:r>
+              <a:r>
                 <a:rPr kumimoji="0" lang="en-IN" sz="1400" b="1" i="0" u="none" strike="noStrike" kern="1200" cap="none" spc="0" normalizeH="0" baseline="0" noProof="0" dirty="0" err="1">
                   <a:ln>
                     <a:noFill/>
@@ -7148,7 +7165,7 @@
                   <a:uFillTx/>
                   <a:latin typeface="Bahnschrift" panose="020B0502040204020203" pitchFamily="34" charset="0"/>
                 </a:rPr>
-                <a:t>yyyy</a:t>
+                <a:t>Ghugan</a:t>
               </a:r>
               <a:endParaRPr kumimoji="0" lang="en-IN" sz="1400" b="1" i="0" u="none" strike="noStrike" kern="1200" cap="none" spc="0" normalizeH="0" baseline="0" noProof="0" dirty="0">
                 <a:ln>
@@ -8192,8 +8209,8 @@
         </p:blipFill>
         <p:spPr>
           <a:xfrm>
-            <a:off x="1371749" y="1111487"/>
-            <a:ext cx="1723857" cy="1686657"/>
+            <a:off x="1367158" y="1090596"/>
+            <a:ext cx="1723853" cy="1717472"/>
           </a:xfrm>
           <a:prstGeom prst="rect">
             <a:avLst/>
@@ -8254,7 +8271,7 @@
                 </a:solidFill>
                 <a:latin typeface="Bahnschrift" panose="020B0502040204020203" pitchFamily="34" charset="0"/>
               </a:rPr>
-              <a:t>Lalitha</a:t>
+              <a:t>Lalitha S</a:t>
             </a:r>
             <a:endParaRPr kumimoji="0" lang="en-IN" sz="1400" b="1" i="0" u="none" strike="noStrike" kern="1200" cap="none" spc="0" normalizeH="0" baseline="0" noProof="0" dirty="0">
               <a:ln>
@@ -8273,6 +8290,287 @@
           </a:p>
         </p:txBody>
       </p:sp>
+      <p:sp>
+        <p:nvSpPr>
+          <p:cNvPr id="53" name="Rectangle 52">
+            <a:extLst>
+              <a:ext uri="{FF2B5EF4-FFF2-40B4-BE49-F238E27FC236}">
+                <a16:creationId xmlns:a16="http://schemas.microsoft.com/office/drawing/2014/main" id="{C1AFA59D-428F-444A-887A-B20753F3F62D}"/>
+              </a:ext>
+            </a:extLst>
+          </p:cNvPr>
+          <p:cNvSpPr/>
+          <p:nvPr/>
+        </p:nvSpPr>
+        <p:spPr>
+          <a:xfrm>
+            <a:off x="6534708" y="1069704"/>
+            <a:ext cx="1701511" cy="1728440"/>
+          </a:xfrm>
+          <a:prstGeom prst="rect">
+            <a:avLst/>
+          </a:prstGeom>
+          <a:blipFill rotWithShape="1">
+            <a:blip r:embed="rId3"/>
+            <a:stretch>
+              <a:fillRect/>
+            </a:stretch>
+          </a:blipFill>
+          <a:ln w="3175">
+            <a:solidFill>
+              <a:schemeClr val="bg1">
+                <a:lumMod val="85000"/>
+              </a:schemeClr>
+            </a:solidFill>
+          </a:ln>
+        </p:spPr>
+        <p:style>
+          <a:lnRef idx="2">
+            <a:schemeClr val="accent1">
+              <a:shade val="15000"/>
+            </a:schemeClr>
+          </a:lnRef>
+          <a:fillRef idx="1">
+            <a:schemeClr val="accent1"/>
+          </a:fillRef>
+          <a:effectRef idx="0">
+            <a:schemeClr val="accent1"/>
+          </a:effectRef>
+          <a:fontRef idx="minor">
+            <a:schemeClr val="lt1"/>
+          </a:fontRef>
+        </p:style>
+        <p:txBody>
+          <a:bodyPr rtlCol="0" anchor="ctr"/>
+          <a:lstStyle/>
+          <a:p>
+            <a:pPr marL="0" marR="0" lvl="0" indent="0" algn="ctr" defTabSz="914400" rtl="0" eaLnBrk="1" fontAlgn="auto" latinLnBrk="0" hangingPunct="1">
+              <a:lnSpc>
+                <a:spcPct val="100000"/>
+              </a:lnSpc>
+              <a:spcBef>
+                <a:spcPts val="0"/>
+              </a:spcBef>
+              <a:spcAft>
+                <a:spcPts val="0"/>
+              </a:spcAft>
+              <a:buClrTx/>
+              <a:buSzTx/>
+              <a:buFontTx/>
+              <a:buNone/>
+              <a:defRPr/>
+            </a:pPr>
+            <a:endParaRPr kumimoji="0" lang="en-IN" sz="1800" b="0" i="0" u="none" strike="noStrike" kern="1200" cap="none" spc="0" normalizeH="0" baseline="0" noProof="0">
+              <a:ln>
+                <a:noFill/>
+              </a:ln>
+              <a:solidFill>
+                <a:prstClr val="white"/>
+              </a:solidFill>
+              <a:effectLst/>
+              <a:uLnTx/>
+              <a:uFillTx/>
+              <a:latin typeface="Aptos" panose="02110004020202020204"/>
+              <a:ea typeface="+mn-ea"/>
+              <a:cs typeface="+mn-cs"/>
+            </a:endParaRPr>
+          </a:p>
+        </p:txBody>
+      </p:sp>
+      <p:sp>
+        <p:nvSpPr>
+          <p:cNvPr id="55" name="Rectangle 54">
+            <a:extLst>
+              <a:ext uri="{FF2B5EF4-FFF2-40B4-BE49-F238E27FC236}">
+                <a16:creationId xmlns:a16="http://schemas.microsoft.com/office/drawing/2014/main" id="{E00F553A-E78A-4DB1-8B8E-51F5AFD4C786}"/>
+              </a:ext>
+            </a:extLst>
+          </p:cNvPr>
+          <p:cNvSpPr/>
+          <p:nvPr/>
+        </p:nvSpPr>
+        <p:spPr>
+          <a:xfrm>
+            <a:off x="9114150" y="1090595"/>
+            <a:ext cx="1728440" cy="1728440"/>
+          </a:xfrm>
+          <a:prstGeom prst="rect">
+            <a:avLst/>
+          </a:prstGeom>
+          <a:blipFill rotWithShape="1">
+            <a:blip r:embed="rId4"/>
+            <a:stretch>
+              <a:fillRect/>
+            </a:stretch>
+          </a:blipFill>
+          <a:ln w="3175">
+            <a:solidFill>
+              <a:schemeClr val="bg1">
+                <a:lumMod val="85000"/>
+              </a:schemeClr>
+            </a:solidFill>
+          </a:ln>
+        </p:spPr>
+        <p:style>
+          <a:lnRef idx="2">
+            <a:schemeClr val="accent1">
+              <a:shade val="15000"/>
+            </a:schemeClr>
+          </a:lnRef>
+          <a:fillRef idx="1">
+            <a:schemeClr val="accent1"/>
+          </a:fillRef>
+          <a:effectRef idx="0">
+            <a:schemeClr val="accent1"/>
+          </a:effectRef>
+          <a:fontRef idx="minor">
+            <a:schemeClr val="lt1"/>
+          </a:fontRef>
+        </p:style>
+        <p:txBody>
+          <a:bodyPr rtlCol="0" anchor="ctr"/>
+          <a:lstStyle/>
+          <a:p>
+            <a:pPr marL="0" marR="0" lvl="0" indent="0" algn="ctr" defTabSz="914400" rtl="0" eaLnBrk="1" fontAlgn="auto" latinLnBrk="0" hangingPunct="1">
+              <a:lnSpc>
+                <a:spcPct val="100000"/>
+              </a:lnSpc>
+              <a:spcBef>
+                <a:spcPts val="0"/>
+              </a:spcBef>
+              <a:spcAft>
+                <a:spcPts val="0"/>
+              </a:spcAft>
+              <a:buClrTx/>
+              <a:buSzTx/>
+              <a:buFontTx/>
+              <a:buNone/>
+              <a:defRPr/>
+            </a:pPr>
+            <a:endParaRPr kumimoji="0" lang="en-IN" sz="1800" b="0" i="0" u="none" strike="noStrike" kern="1200" cap="none" spc="0" normalizeH="0" baseline="0" noProof="0" dirty="0">
+              <a:ln>
+                <a:noFill/>
+              </a:ln>
+              <a:solidFill>
+                <a:prstClr val="white"/>
+              </a:solidFill>
+              <a:effectLst/>
+              <a:uLnTx/>
+              <a:uFillTx/>
+              <a:latin typeface="Aptos" panose="02110004020202020204"/>
+              <a:ea typeface="+mn-ea"/>
+              <a:cs typeface="+mn-cs"/>
+            </a:endParaRPr>
+          </a:p>
+        </p:txBody>
+      </p:sp>
+      <p:pic>
+        <p:nvPicPr>
+          <p:cNvPr id="7" name="Picture 6">
+            <a:extLst>
+              <a:ext uri="{FF2B5EF4-FFF2-40B4-BE49-F238E27FC236}">
+                <a16:creationId xmlns:a16="http://schemas.microsoft.com/office/drawing/2014/main" id="{BA4ADC66-807F-4691-84F9-05A42EDBC26C}"/>
+              </a:ext>
+            </a:extLst>
+          </p:cNvPr>
+          <p:cNvPicPr>
+            <a:picLocks noChangeAspect="1"/>
+          </p:cNvPicPr>
+          <p:nvPr/>
+        </p:nvPicPr>
+        <p:blipFill rotWithShape="1">
+          <a:blip r:embed="rId5">
+            <a:extLst>
+              <a:ext uri="{28A0092B-C50C-407E-A947-70E740481C1C}">
+                <a14:useLocalDpi xmlns:a14="http://schemas.microsoft.com/office/drawing/2010/main" val="0"/>
+              </a:ext>
+            </a:extLst>
+          </a:blip>
+          <a:srcRect r="4708"/>
+          <a:stretch/>
+        </p:blipFill>
+        <p:spPr>
+          <a:xfrm>
+            <a:off x="1382527" y="4105288"/>
+            <a:ext cx="1713075" cy="1767920"/>
+          </a:xfrm>
+          <a:prstGeom prst="rect">
+            <a:avLst/>
+          </a:prstGeom>
+        </p:spPr>
+      </p:pic>
+      <p:pic>
+        <p:nvPicPr>
+          <p:cNvPr id="9" name="Picture 8">
+            <a:extLst>
+              <a:ext uri="{FF2B5EF4-FFF2-40B4-BE49-F238E27FC236}">
+                <a16:creationId xmlns:a16="http://schemas.microsoft.com/office/drawing/2014/main" id="{C0287BBA-1FE7-4E90-8007-735C837CFD4F}"/>
+              </a:ext>
+            </a:extLst>
+          </p:cNvPr>
+          <p:cNvPicPr>
+            <a:picLocks noChangeAspect="1"/>
+          </p:cNvPicPr>
+          <p:nvPr/>
+        </p:nvPicPr>
+        <p:blipFill>
+          <a:blip r:embed="rId6">
+            <a:extLst>
+              <a:ext uri="{28A0092B-C50C-407E-A947-70E740481C1C}">
+                <a14:useLocalDpi xmlns:a14="http://schemas.microsoft.com/office/drawing/2010/main" val="0"/>
+              </a:ext>
+            </a:extLst>
+          </a:blip>
+          <a:stretch>
+            <a:fillRect/>
+          </a:stretch>
+        </p:blipFill>
+        <p:spPr>
+          <a:xfrm>
+            <a:off x="3943572" y="4096304"/>
+            <a:ext cx="1731087" cy="1728440"/>
+          </a:xfrm>
+          <a:prstGeom prst="rect">
+            <a:avLst/>
+          </a:prstGeom>
+        </p:spPr>
+      </p:pic>
+      <p:pic>
+        <p:nvPicPr>
+          <p:cNvPr id="41" name="Picture 40">
+            <a:extLst>
+              <a:ext uri="{FF2B5EF4-FFF2-40B4-BE49-F238E27FC236}">
+                <a16:creationId xmlns:a16="http://schemas.microsoft.com/office/drawing/2014/main" id="{94E99370-516E-46F2-839C-3DA18DD26D1A}"/>
+              </a:ext>
+            </a:extLst>
+          </p:cNvPr>
+          <p:cNvPicPr>
+            <a:picLocks noChangeAspect="1"/>
+          </p:cNvPicPr>
+          <p:nvPr/>
+        </p:nvPicPr>
+        <p:blipFill>
+          <a:blip r:embed="rId7">
+            <a:extLst>
+              <a:ext uri="{28A0092B-C50C-407E-A947-70E740481C1C}">
+                <a14:useLocalDpi xmlns:a14="http://schemas.microsoft.com/office/drawing/2010/main" val="0"/>
+              </a:ext>
+            </a:extLst>
+          </a:blip>
+          <a:stretch>
+            <a:fillRect/>
+          </a:stretch>
+        </p:blipFill>
+        <p:spPr>
+          <a:xfrm>
+            <a:off x="3941879" y="1050833"/>
+            <a:ext cx="1757068" cy="1766218"/>
+          </a:xfrm>
+          <a:prstGeom prst="rect">
+            <a:avLst/>
+          </a:prstGeom>
+        </p:spPr>
+      </p:pic>
     </p:spTree>
     <p:extLst>
       <p:ext uri="{BB962C8B-B14F-4D97-AF65-F5344CB8AC3E}">
@@ -8317,10 +8615,10 @@
         </p:nvGrpSpPr>
         <p:grpSpPr>
           <a:xfrm>
-            <a:off x="-3252787" y="854337"/>
-            <a:ext cx="15691189" cy="5366179"/>
-            <a:chOff x="-3085773" y="864775"/>
-            <a:chExt cx="15691189" cy="5366179"/>
+            <a:off x="529046" y="854337"/>
+            <a:ext cx="11909356" cy="5366179"/>
+            <a:chOff x="696060" y="864775"/>
+            <a:chExt cx="11909356" cy="5366179"/>
           </a:xfrm>
         </p:grpSpPr>
         <p:grpSp>
@@ -8704,10 +9002,10 @@
           </p:nvGrpSpPr>
           <p:grpSpPr>
             <a:xfrm>
-              <a:off x="-3085773" y="3448718"/>
-              <a:ext cx="15691189" cy="2781858"/>
-              <a:chOff x="-3124539" y="3198800"/>
-              <a:chExt cx="15691189" cy="2781858"/>
+              <a:off x="696060" y="3448718"/>
+              <a:ext cx="11909356" cy="2781858"/>
+              <a:chOff x="657294" y="3198800"/>
+              <a:chExt cx="11909356" cy="2781858"/>
             </a:xfrm>
           </p:grpSpPr>
           <p:grpSp>
@@ -8724,10 +9022,10 @@
             </p:nvGrpSpPr>
             <p:grpSpPr>
               <a:xfrm>
-                <a:off x="-3124539" y="3198800"/>
-                <a:ext cx="15691189" cy="2781858"/>
-                <a:chOff x="-3079934" y="3198800"/>
-                <a:chExt cx="15691189" cy="2781858"/>
+                <a:off x="657294" y="3198800"/>
+                <a:ext cx="11909356" cy="2781858"/>
+                <a:chOff x="701899" y="3198800"/>
+                <a:chExt cx="11909356" cy="2781858"/>
               </a:xfrm>
             </p:grpSpPr>
             <p:sp>
@@ -9095,203 +9393,6 @@
                     </a:rPr>
                     <a:t>Domain</a:t>
                   </a:r>
-                </a:p>
-              </p:txBody>
-            </p:sp>
-            <p:sp>
-              <p:nvSpPr>
-                <p:cNvPr id="31" name="TextBox 30">
-                  <a:extLst>
-                    <a:ext uri="{FF2B5EF4-FFF2-40B4-BE49-F238E27FC236}">
-                      <a16:creationId xmlns:a16="http://schemas.microsoft.com/office/drawing/2014/main" id="{7283AD80-BE97-AB16-64F3-F4355CC2B1A2}"/>
-                    </a:ext>
-                  </a:extLst>
-                </p:cNvPr>
-                <p:cNvSpPr txBox="1"/>
-                <p:nvPr/>
-              </p:nvSpPr>
-              <p:spPr>
-                <a:xfrm>
-                  <a:off x="-3079934" y="4026878"/>
-                  <a:ext cx="2307274" cy="1600438"/>
-                </a:xfrm>
-                <a:prstGeom prst="rect">
-                  <a:avLst/>
-                </a:prstGeom>
-                <a:noFill/>
-              </p:spPr>
-              <p:txBody>
-                <a:bodyPr wrap="square" lIns="91440" tIns="45720" rIns="91440" bIns="45720" rtlCol="0" anchor="t">
-                  <a:spAutoFit/>
-                </a:bodyPr>
-                <a:lstStyle/>
-                <a:p>
-                  <a:pPr marL="285750" marR="0" lvl="0" indent="-285750" algn="l" defTabSz="914400" rtl="0" eaLnBrk="1" fontAlgn="auto" latinLnBrk="0" hangingPunct="1">
-                    <a:lnSpc>
-                      <a:spcPct val="200000"/>
-                    </a:lnSpc>
-                    <a:spcBef>
-                      <a:spcPts val="0"/>
-                    </a:spcBef>
-                    <a:spcAft>
-                      <a:spcPts val="0"/>
-                    </a:spcAft>
-                    <a:buClrTx/>
-                    <a:buSzTx/>
-                    <a:buFont typeface="Arial" panose="020B0604020202020204" pitchFamily="34" charset="0"/>
-                    <a:buChar char="•"/>
-                    <a:tabLst/>
-                    <a:defRPr/>
-                  </a:pPr>
-                  <a:r>
-                    <a:rPr lang="en-IN" sz="1400" dirty="0"/>
-                    <a:t>Growing </a:t>
-                  </a:r>
-                  <a:r>
-                    <a:rPr lang="en-IN" sz="1400" dirty="0" err="1"/>
-                    <a:t>startups</a:t>
-                  </a:r>
-                  <a:r>
-                    <a:rPr kumimoji="0" lang="en-US" sz="1400" b="0" i="0" u="none" strike="noStrike" kern="1200" cap="none" spc="0" normalizeH="0" baseline="0" noProof="0" dirty="0">
-                      <a:ln>
-                        <a:noFill/>
-                      </a:ln>
-                      <a:solidFill>
-                        <a:prstClr val="black"/>
-                      </a:solidFill>
-                      <a:effectLst/>
-                      <a:uLnTx/>
-                      <a:uFillTx/>
-                      <a:latin typeface="Aptos" panose="02110004020202020204"/>
-                      <a:ea typeface="+mn-ea"/>
-                      <a:cs typeface="Times New Roman" panose="02020603050405020304" pitchFamily="18" charset="0"/>
-                    </a:rPr>
-                    <a:t> </a:t>
-                  </a:r>
-                </a:p>
-                <a:p>
-                  <a:pPr marL="285750" marR="0" lvl="0" indent="-285750" algn="l" defTabSz="914400" rtl="0" eaLnBrk="1" fontAlgn="auto" latinLnBrk="0" hangingPunct="1">
-                    <a:lnSpc>
-                      <a:spcPct val="200000"/>
-                    </a:lnSpc>
-                    <a:spcBef>
-                      <a:spcPts val="0"/>
-                    </a:spcBef>
-                    <a:spcAft>
-                      <a:spcPts val="0"/>
-                    </a:spcAft>
-                    <a:buClrTx/>
-                    <a:buSzTx/>
-                    <a:buFont typeface="Arial" panose="020B0604020202020204" pitchFamily="34" charset="0"/>
-                    <a:buChar char="•"/>
-                    <a:tabLst/>
-                    <a:defRPr/>
-                  </a:pPr>
-                  <a:r>
-                    <a:rPr lang="en-IN" sz="1400" dirty="0"/>
-                    <a:t>Finance departments</a:t>
-                  </a:r>
-                  <a:endParaRPr kumimoji="0" lang="en-US" sz="1400" b="0" i="0" u="none" strike="noStrike" kern="1200" cap="none" spc="0" normalizeH="0" baseline="0" noProof="0" dirty="0">
-                    <a:ln>
-                      <a:noFill/>
-                    </a:ln>
-                    <a:solidFill>
-                      <a:prstClr val="black"/>
-                    </a:solidFill>
-                    <a:effectLst/>
-                    <a:uLnTx/>
-                    <a:uFillTx/>
-                    <a:latin typeface="Aptos" panose="02110004020202020204"/>
-                    <a:ea typeface="+mn-ea"/>
-                    <a:cs typeface="Times New Roman"/>
-                  </a:endParaRPr>
-                </a:p>
-                <a:p>
-                  <a:pPr marL="285750" marR="0" lvl="0" indent="-285750" algn="l" defTabSz="914400" rtl="0" eaLnBrk="1" fontAlgn="auto" latinLnBrk="0" hangingPunct="1">
-                    <a:lnSpc>
-                      <a:spcPct val="200000"/>
-                    </a:lnSpc>
-                    <a:spcBef>
-                      <a:spcPts val="0"/>
-                    </a:spcBef>
-                    <a:spcAft>
-                      <a:spcPts val="0"/>
-                    </a:spcAft>
-                    <a:buClrTx/>
-                    <a:buSzTx/>
-                    <a:buFont typeface="Arial" panose="020B0604020202020204" pitchFamily="34" charset="0"/>
-                    <a:buChar char="•"/>
-                    <a:tabLst/>
-                    <a:defRPr/>
-                  </a:pPr>
-                  <a:r>
-                    <a:rPr lang="en-IN" sz="1400" dirty="0"/>
-                    <a:t>Medium enterprise</a:t>
-                  </a:r>
-                  <a:r>
-                    <a:rPr kumimoji="0" lang="en-US" sz="1400" b="0" i="0" u="none" strike="noStrike" kern="1200" cap="none" spc="0" normalizeH="0" baseline="0" noProof="0" dirty="0">
-                      <a:ln>
-                        <a:noFill/>
-                      </a:ln>
-                      <a:solidFill>
-                        <a:prstClr val="black"/>
-                      </a:solidFill>
-                      <a:effectLst/>
-                      <a:uLnTx/>
-                      <a:uFillTx/>
-                      <a:latin typeface="Aptos" panose="02110004020202020204"/>
-                      <a:ea typeface="+mn-ea"/>
-                      <a:cs typeface="Times New Roman"/>
-                    </a:rPr>
-                    <a:t>s</a:t>
-                  </a:r>
-                  <a:endParaRPr kumimoji="0" lang="en-IN" sz="1400" b="0" i="0" u="none" strike="noStrike" kern="1200" cap="none" spc="0" normalizeH="0" baseline="0" noProof="0" dirty="0">
-                    <a:ln>
-                      <a:noFill/>
-                    </a:ln>
-                    <a:solidFill>
-                      <a:prstClr val="black"/>
-                    </a:solidFill>
-                    <a:effectLst/>
-                    <a:uLnTx/>
-                    <a:uFillTx/>
-                    <a:latin typeface="Aptos" panose="02110004020202020204"/>
-                    <a:ea typeface="+mn-ea"/>
-                    <a:cs typeface="Times New Roman"/>
-                  </a:endParaRPr>
-                </a:p>
-                <a:p>
-                  <a:pPr marL="0" marR="0" lvl="0" indent="0" algn="just" defTabSz="914400" rtl="0" eaLnBrk="1" fontAlgn="auto" latinLnBrk="0" hangingPunct="1">
-                    <a:lnSpc>
-                      <a:spcPct val="100000"/>
-                    </a:lnSpc>
-                    <a:spcBef>
-                      <a:spcPts val="0"/>
-                    </a:spcBef>
-                    <a:spcAft>
-                      <a:spcPts val="0"/>
-                    </a:spcAft>
-                    <a:buClrTx/>
-                    <a:buSzTx/>
-                    <a:buFontTx/>
-                    <a:buNone/>
-                    <a:tabLst/>
-                    <a:defRPr/>
-                  </a:pPr>
-                  <a:endParaRPr kumimoji="0" lang="en-IN" sz="1400" b="0" i="0" u="none" strike="noStrike" kern="1200" cap="none" spc="0" normalizeH="0" baseline="0" noProof="0" dirty="0">
-                    <a:ln>
-                      <a:noFill/>
-                    </a:ln>
-                    <a:solidFill>
-                      <a:prstClr val="black"/>
-                    </a:solidFill>
-                    <a:effectLst/>
-                    <a:uLnTx/>
-                    <a:uFillTx/>
-                    <a:latin typeface="Aptos" panose="02110004020202020204"/>
-                    <a:ea typeface="+mn-ea"/>
-                    <a:cs typeface="+mn-cs"/>
-                  </a:endParaRPr>
                 </a:p>
               </p:txBody>
             </p:sp>
@@ -18174,7 +18275,7 @@
                 <a:defRPr/>
               </a:pPr>
               <a:r>
-                <a:rPr kumimoji="0" lang="en-IN" sz="1400" b="0" i="0" u="none" strike="noStrike" kern="1200" cap="none" spc="0" normalizeH="0" baseline="0" noProof="0">
+                <a:rPr kumimoji="0" lang="en-IN" sz="1400" b="0" i="0" u="none" strike="noStrike" kern="1200" cap="none" spc="0" normalizeH="0" baseline="0" noProof="0" dirty="0">
                   <a:ln>
                     <a:noFill/>
                   </a:ln>
@@ -18191,7 +18292,7 @@
                 <a:t>Project presentation (this document) is available at </a:t>
               </a:r>
               <a:r>
-                <a:rPr kumimoji="0" lang="en-IN" sz="1400" b="0" i="0" u="none" strike="noStrike" kern="1200" cap="none" spc="0" normalizeH="0" baseline="0" noProof="0">
+                <a:rPr kumimoji="0" lang="en-IN" sz="1400" b="0" i="0" u="none" strike="noStrike" kern="1200" cap="none" spc="0" normalizeH="0" baseline="0" noProof="0" dirty="0">
                   <a:ln>
                     <a:noFill/>
                   </a:ln>
@@ -18208,7 +18309,7 @@
                 </a:rPr>
                 <a:t>Link</a:t>
               </a:r>
-              <a:endParaRPr kumimoji="0" lang="en-IN" sz="1400" b="0" i="0" u="none" strike="noStrike" kern="1200" cap="none" spc="0" normalizeH="0" baseline="0" noProof="0">
+              <a:endParaRPr kumimoji="0" lang="en-IN" sz="1400" b="0" i="0" u="none" strike="noStrike" kern="1200" cap="none" spc="0" normalizeH="0" baseline="0" noProof="0" dirty="0">
                 <a:ln>
                   <a:noFill/>
                 </a:ln>
@@ -18292,7 +18393,7 @@
                 <a:defRPr/>
               </a:pPr>
               <a:r>
-                <a:rPr kumimoji="0" lang="en-IN" sz="1800" b="1" i="0" u="none" strike="noStrike" kern="1200" cap="none" spc="0" normalizeH="0" baseline="0" noProof="0">
+                <a:rPr kumimoji="0" lang="en-IN" sz="1800" b="1" i="0" u="none" strike="noStrike" kern="1200" cap="none" spc="0" normalizeH="0" baseline="0" noProof="0" dirty="0">
                   <a:ln>
                     <a:noFill/>
                   </a:ln>
@@ -18357,7 +18458,7 @@
                 <a:defRPr/>
               </a:pPr>
               <a:r>
-                <a:rPr kumimoji="0" lang="en-IN" sz="1400" b="0" i="0" u="none" strike="noStrike" kern="1200" cap="none" spc="0" normalizeH="0" baseline="0" noProof="0">
+                <a:rPr kumimoji="0" lang="en-IN" sz="1400" b="0" i="0" u="none" strike="noStrike" kern="1200" cap="none" spc="0" normalizeH="0" baseline="0" noProof="0" dirty="0">
                   <a:ln>
                     <a:noFill/>
                   </a:ln>
@@ -18374,7 +18475,7 @@
                 <a:t>Project requirement document / specification is available at </a:t>
               </a:r>
               <a:r>
-                <a:rPr kumimoji="0" lang="en-IN" sz="1400" b="0" i="0" u="none" strike="noStrike" kern="1200" cap="none" spc="0" normalizeH="0" baseline="0" noProof="0">
+                <a:rPr kumimoji="0" lang="en-IN" sz="1400" b="0" i="0" u="none" strike="noStrike" kern="1200" cap="none" spc="0" normalizeH="0" baseline="0" noProof="0" dirty="0">
                   <a:ln>
                     <a:noFill/>
                   </a:ln>
@@ -18391,7 +18492,7 @@
                 </a:rPr>
                 <a:t>Link</a:t>
               </a:r>
-              <a:endParaRPr kumimoji="0" lang="en-IN" sz="1400" b="0" i="0" u="none" strike="noStrike" kern="1200" cap="none" spc="0" normalizeH="0" baseline="0" noProof="0">
+              <a:endParaRPr kumimoji="0" lang="en-IN" sz="1400" b="0" i="0" u="none" strike="noStrike" kern="1200" cap="none" spc="0" normalizeH="0" baseline="0" noProof="0" dirty="0">
                 <a:ln>
                   <a:noFill/>
                 </a:ln>
@@ -18723,7 +18824,7 @@
                 <a:defRPr/>
               </a:pPr>
               <a:r>
-                <a:rPr kumimoji="0" lang="en-IN" sz="1400" b="0" i="0" u="none" strike="noStrike" kern="1200" cap="none" spc="0" normalizeH="0" baseline="0" noProof="0">
+                <a:rPr kumimoji="0" lang="en-IN" sz="1400" b="0" i="0" u="none" strike="noStrike" kern="1200" cap="none" spc="0" normalizeH="0" baseline="0" noProof="0" dirty="0">
                   <a:ln>
                     <a:noFill/>
                   </a:ln>
@@ -18740,7 +18841,7 @@
                 <a:t>Application is available at </a:t>
               </a:r>
               <a:r>
-                <a:rPr kumimoji="0" lang="en-IN" sz="1400" b="0" i="0" u="none" strike="noStrike" kern="1200" cap="none" spc="0" normalizeH="0" baseline="0" noProof="0">
+                <a:rPr kumimoji="0" lang="en-IN" sz="1400" b="0" i="0" u="none" strike="noStrike" kern="1200" cap="none" spc="0" normalizeH="0" baseline="0" noProof="0" dirty="0">
                   <a:ln>
                     <a:noFill/>
                   </a:ln>
@@ -18753,11 +18854,11 @@
                   <a:latin typeface="Aptos" panose="02110004020202020204"/>
                   <a:ea typeface="+mn-ea"/>
                   <a:cs typeface="+mn-cs"/>
-                  <a:hlinkClick r:id="rId9"/>
+                  <a:hlinkClick r:id="rId8"/>
                 </a:rPr>
                 <a:t>Link</a:t>
               </a:r>
-              <a:endParaRPr kumimoji="0" lang="en-IN" sz="1400" b="0" i="0" u="none" strike="noStrike" kern="1200" cap="none" spc="0" normalizeH="0" baseline="0" noProof="0">
+              <a:endParaRPr kumimoji="0" lang="en-IN" sz="1400" b="0" i="0" u="none" strike="noStrike" kern="1200" cap="none" spc="0" normalizeH="0" baseline="0" noProof="0" dirty="0">
                 <a:ln>
                   <a:noFill/>
                 </a:ln>
@@ -18936,7 +19037,7 @@
                   <a:latin typeface="Aptos" panose="02110004020202020204"/>
                   <a:ea typeface="+mn-ea"/>
                   <a:cs typeface="+mn-cs"/>
-                  <a:hlinkClick r:id="rId10"/>
+                  <a:hlinkClick r:id="rId9"/>
                 </a:rPr>
                 <a:t>Link</a:t>
               </a:r>
@@ -19119,7 +19220,7 @@
                   <a:latin typeface="Aptos" panose="02110004020202020204"/>
                   <a:ea typeface="+mn-ea"/>
                   <a:cs typeface="+mn-cs"/>
-                  <a:hlinkClick r:id="rId11"/>
+                  <a:hlinkClick r:id="rId10"/>
                 </a:rPr>
                 <a:t>Link</a:t>
               </a:r>
@@ -19137,7 +19238,7 @@
                   <a:latin typeface="Aptos" panose="02110004020202020204"/>
                   <a:ea typeface="+mn-ea"/>
                   <a:cs typeface="+mn-cs"/>
-                  <a:hlinkClick r:id="rId12"/>
+                  <a:hlinkClick r:id="rId11"/>
                 </a:rPr>
               </a:br>
               <a:endParaRPr kumimoji="0" lang="en-IN" sz="1400" b="0" i="0" u="none" strike="noStrike" kern="1200" cap="none" spc="0" normalizeH="0" baseline="0" noProof="0" dirty="0">

</xml_diff>